<commit_message>
Add a data flow diagram
</commit_message>
<xml_diff>
--- a/Documentation/useCaseDiagrams/usecasePresentation.pptx
+++ b/Documentation/useCaseDiagrams/usecasePresentation.pptx
@@ -10,7 +10,8 @@
     <p:sldId id="259" r:id="rId4"/>
     <p:sldId id="260" r:id="rId5"/>
     <p:sldId id="261" r:id="rId6"/>
-    <p:sldId id="262" r:id="rId7"/>
+    <p:sldId id="263" r:id="rId7"/>
+    <p:sldId id="262" r:id="rId8"/>
   </p:sldIdLst>
   <p:sldSz cx="12192000" cy="6858000"/>
   <p:notesSz cx="6858000" cy="9144000"/>
@@ -3348,9 +3349,10 @@
           <a:lstStyle/>
           <a:p>
             <a:r>
-              <a:rPr lang="en-US" dirty="0"/>
-              <a:t>uplift</a:t>
-            </a:r>
+              <a:rPr lang="en-US" dirty="0" err="1"/>
+              <a:t>upLift</a:t>
+            </a:r>
+            <a:endParaRPr lang="en-US" dirty="0"/>
           </a:p>
         </p:txBody>
       </p:sp>
@@ -3801,6 +3803,98 @@
           <p:cNvPr id="2" name="Title 1">
             <a:extLst>
               <a:ext uri="{FF2B5EF4-FFF2-40B4-BE49-F238E27FC236}">
+                <a16:creationId xmlns:a16="http://schemas.microsoft.com/office/drawing/2014/main" id="{EBDA812E-73CF-96C0-C57D-2ADBE1E76379}"/>
+              </a:ext>
+            </a:extLst>
+          </p:cNvPr>
+          <p:cNvSpPr>
+            <a:spLocks noGrp="1"/>
+          </p:cNvSpPr>
+          <p:nvPr>
+            <p:ph type="title"/>
+          </p:nvPr>
+        </p:nvSpPr>
+        <p:spPr>
+          <a:xfrm>
+            <a:off x="838200" y="365125"/>
+            <a:ext cx="2585720" cy="1325563"/>
+          </a:xfrm>
+        </p:spPr>
+        <p:txBody>
+          <a:bodyPr/>
+          <a:lstStyle/>
+          <a:p>
+            <a:r>
+              <a:rPr lang="en-US" dirty="0"/>
+              <a:t>SAD</a:t>
+            </a:r>
+          </a:p>
+        </p:txBody>
+      </p:sp>
+      <p:pic>
+        <p:nvPicPr>
+          <p:cNvPr id="5" name="Content Placeholder 4" descr="Diagram&#10;&#10;Description automatically generated with low confidence">
+            <a:extLst>
+              <a:ext uri="{FF2B5EF4-FFF2-40B4-BE49-F238E27FC236}">
+                <a16:creationId xmlns:a16="http://schemas.microsoft.com/office/drawing/2014/main" id="{1269D982-6931-972E-B870-A04E58B3EC9B}"/>
+              </a:ext>
+            </a:extLst>
+          </p:cNvPr>
+          <p:cNvPicPr>
+            <a:picLocks noGrp="1" noChangeAspect="1"/>
+          </p:cNvPicPr>
+          <p:nvPr>
+            <p:ph idx="1"/>
+          </p:nvPr>
+        </p:nvPicPr>
+        <p:blipFill>
+          <a:blip r:embed="rId2"/>
+          <a:stretch>
+            <a:fillRect/>
+          </a:stretch>
+        </p:blipFill>
+        <p:spPr>
+          <a:xfrm>
+            <a:off x="3423920" y="0"/>
+            <a:ext cx="8768080" cy="6874360"/>
+          </a:xfrm>
+        </p:spPr>
+      </p:pic>
+    </p:spTree>
+    <p:extLst>
+      <p:ext uri="{BB962C8B-B14F-4D97-AF65-F5344CB8AC3E}">
+        <p14:creationId xmlns:p14="http://schemas.microsoft.com/office/powerpoint/2010/main" val="2933127326"/>
+      </p:ext>
+    </p:extLst>
+  </p:cSld>
+  <p:clrMapOvr>
+    <a:masterClrMapping/>
+  </p:clrMapOvr>
+</p:sld>
+</file>
+
+<file path=ppt/slides/slide7.xml><?xml version="1.0" encoding="utf-8"?>
+<p:sld xmlns:a="http://schemas.openxmlformats.org/drawingml/2006/main" xmlns:r="http://schemas.openxmlformats.org/officeDocument/2006/relationships" xmlns:p="http://schemas.openxmlformats.org/presentationml/2006/main">
+  <p:cSld>
+    <p:spTree>
+      <p:nvGrpSpPr>
+        <p:cNvPr id="1" name=""/>
+        <p:cNvGrpSpPr/>
+        <p:nvPr/>
+      </p:nvGrpSpPr>
+      <p:grpSpPr>
+        <a:xfrm>
+          <a:off x="0" y="0"/>
+          <a:ext cx="0" cy="0"/>
+          <a:chOff x="0" y="0"/>
+          <a:chExt cx="0" cy="0"/>
+        </a:xfrm>
+      </p:grpSpPr>
+      <p:sp>
+        <p:nvSpPr>
+          <p:cNvPr id="2" name="Title 1">
+            <a:extLst>
+              <a:ext uri="{FF2B5EF4-FFF2-40B4-BE49-F238E27FC236}">
                 <a16:creationId xmlns:a16="http://schemas.microsoft.com/office/drawing/2014/main" id="{614BC3C4-B6D8-BDCF-F28D-84C34BFB93A7}"/>
               </a:ext>
             </a:extLst>
@@ -3840,10 +3934,15 @@
             <p:ph idx="1"/>
           </p:nvPr>
         </p:nvSpPr>
-        <p:spPr/>
+        <p:spPr>
+          <a:xfrm>
+            <a:off x="838200" y="1458096"/>
+            <a:ext cx="10515600" cy="5399903"/>
+          </a:xfrm>
+        </p:spPr>
         <p:txBody>
           <a:bodyPr>
-            <a:normAutofit fontScale="92500" lnSpcReduction="20000"/>
+            <a:normAutofit/>
           </a:bodyPr>
           <a:lstStyle/>
           <a:p>
@@ -3853,7 +3952,7 @@
             </a:pPr>
             <a:r>
               <a:rPr lang="en-US" dirty="0"/>
-              <a:t>Completed System Architecture Diagram. To be presented next week</a:t>
+              <a:t>Made small Revisions to Project Plan</a:t>
             </a:r>
           </a:p>
           <a:p>
@@ -3863,7 +3962,7 @@
             </a:pPr>
             <a:r>
               <a:rPr lang="en-US" dirty="0"/>
-              <a:t>Made small Revisions to Project Plan</a:t>
+              <a:t>Cleaned up repository( Added Readme, timeline markdown files)</a:t>
             </a:r>
           </a:p>
           <a:p>
@@ -3891,13 +3990,8 @@
             </a:pPr>
             <a:r>
               <a:rPr lang="en-US" dirty="0"/>
-              <a:t>Status: Slightly behind where I intended to be at this point. Want to have all design done in the next 1-2 weeks to start development ASAP. As a result, UI wireframes may be </a:t>
-            </a:r>
-            <a:r>
-              <a:rPr lang="en-US"/>
-              <a:t>less detailed.</a:t>
-            </a:r>
-            <a:endParaRPr lang="en-US" dirty="0"/>
+              <a:t>Status: Slightly behind where I intended to be at this point. Want to have all design done in the next 1-2 weeks to start development ASAP. As a result, UI wireframes may be less detailed.</a:t>
+            </a:r>
           </a:p>
           <a:p>
             <a:pPr>

</xml_diff>